<commit_message>
IGameObject now includes Animation and Name getter.
IItem no longer exists.

Prezentation was change a little bit.
</commit_message>
<xml_diff>
--- a/Specification_and_Documantation_and_presentation/Prezentace programu.pptx
+++ b/Specification_and_Documantation_and_presentation/Prezentace programu.pptx
@@ -13,11 +13,13 @@
     <p:sldId id="261" r:id="rId7"/>
     <p:sldId id="262" r:id="rId8"/>
     <p:sldId id="269" r:id="rId9"/>
-    <p:sldId id="263" r:id="rId10"/>
-    <p:sldId id="267" r:id="rId11"/>
+    <p:sldId id="270" r:id="rId10"/>
+    <p:sldId id="271" r:id="rId11"/>
     <p:sldId id="264" r:id="rId12"/>
-    <p:sldId id="266" r:id="rId13"/>
-    <p:sldId id="268" r:id="rId14"/>
+    <p:sldId id="263" r:id="rId13"/>
+    <p:sldId id="267" r:id="rId14"/>
+    <p:sldId id="266" r:id="rId15"/>
+    <p:sldId id="268" r:id="rId16"/>
   </p:sldIdLst>
   <p:sldSz cx="12192000" cy="6858000"/>
   <p:notesSz cx="6858000" cy="9144000"/>
@@ -3450,6 +3452,135 @@
           <p:cNvPr id="2" name="Title 1">
             <a:extLst>
               <a:ext uri="{FF2B5EF4-FFF2-40B4-BE49-F238E27FC236}">
+                <a16:creationId xmlns:a16="http://schemas.microsoft.com/office/drawing/2014/main" id="{26C6B609-D836-4593-B561-2B5824C5401C}"/>
+              </a:ext>
+            </a:extLst>
+          </p:cNvPr>
+          <p:cNvSpPr>
+            <a:spLocks noGrp="1"/>
+          </p:cNvSpPr>
+          <p:nvPr>
+            <p:ph type="title"/>
+          </p:nvPr>
+        </p:nvSpPr>
+        <p:spPr/>
+        <p:txBody>
+          <a:bodyPr/>
+          <a:lstStyle/>
+          <a:p>
+            <a:r>
+              <a:rPr lang="cs-CZ" u="sng" dirty="0"/>
+              <a:t>Architektura 2</a:t>
+            </a:r>
+          </a:p>
+        </p:txBody>
+      </p:sp>
+      <p:pic>
+        <p:nvPicPr>
+          <p:cNvPr id="9" name="Content Placeholder 8" descr="A screenshot of a video game&#10;&#10;Description automatically generated">
+            <a:extLst>
+              <a:ext uri="{FF2B5EF4-FFF2-40B4-BE49-F238E27FC236}">
+                <a16:creationId xmlns:a16="http://schemas.microsoft.com/office/drawing/2014/main" id="{127AFFFD-1000-457D-9EF7-E6FBCCE241C7}"/>
+              </a:ext>
+            </a:extLst>
+          </p:cNvPr>
+          <p:cNvPicPr>
+            <a:picLocks noGrp="1" noChangeAspect="1"/>
+          </p:cNvPicPr>
+          <p:nvPr>
+            <p:ph idx="1"/>
+          </p:nvPr>
+        </p:nvPicPr>
+        <p:blipFill>
+          <a:blip r:embed="rId2">
+            <a:extLst>
+              <a:ext uri="{28A0092B-C50C-407E-A947-70E740481C1C}">
+                <a14:useLocalDpi xmlns:a14="http://schemas.microsoft.com/office/drawing/2010/main" val="0"/>
+              </a:ext>
+            </a:extLst>
+          </a:blip>
+          <a:stretch>
+            <a:fillRect/>
+          </a:stretch>
+        </p:blipFill>
+        <p:spPr>
+          <a:xfrm>
+            <a:off x="4843609" y="525095"/>
+            <a:ext cx="6753225" cy="1724025"/>
+          </a:xfrm>
+        </p:spPr>
+      </p:pic>
+      <p:pic>
+        <p:nvPicPr>
+          <p:cNvPr id="12" name="Picture 11">
+            <a:extLst>
+              <a:ext uri="{FF2B5EF4-FFF2-40B4-BE49-F238E27FC236}">
+                <a16:creationId xmlns:a16="http://schemas.microsoft.com/office/drawing/2014/main" id="{108F0E47-838C-4B36-9BDA-B03D91494DB8}"/>
+              </a:ext>
+            </a:extLst>
+          </p:cNvPr>
+          <p:cNvPicPr>
+            <a:picLocks noChangeAspect="1"/>
+          </p:cNvPicPr>
+          <p:nvPr/>
+        </p:nvPicPr>
+        <p:blipFill>
+          <a:blip r:embed="rId3">
+            <a:extLst>
+              <a:ext uri="{28A0092B-C50C-407E-A947-70E740481C1C}">
+                <a14:useLocalDpi xmlns:a14="http://schemas.microsoft.com/office/drawing/2010/main" val="0"/>
+              </a:ext>
+            </a:extLst>
+          </a:blip>
+          <a:stretch>
+            <a:fillRect/>
+          </a:stretch>
+        </p:blipFill>
+        <p:spPr>
+          <a:xfrm>
+            <a:off x="627184" y="2694355"/>
+            <a:ext cx="7153275" cy="3638550"/>
+          </a:xfrm>
+          <a:prstGeom prst="rect">
+            <a:avLst/>
+          </a:prstGeom>
+        </p:spPr>
+      </p:pic>
+    </p:spTree>
+    <p:extLst>
+      <p:ext uri="{BB962C8B-B14F-4D97-AF65-F5344CB8AC3E}">
+        <p14:creationId xmlns:p14="http://schemas.microsoft.com/office/powerpoint/2010/main" val="3313987253"/>
+      </p:ext>
+    </p:extLst>
+  </p:cSld>
+  <p:clrMapOvr>
+    <a:masterClrMapping/>
+  </p:clrMapOvr>
+</p:sld>
+</file>
+
+<file path=ppt/slides/slide11.xml><?xml version="1.0" encoding="utf-8"?>
+<p:sld xmlns:a="http://schemas.openxmlformats.org/drawingml/2006/main" xmlns:r="http://schemas.openxmlformats.org/officeDocument/2006/relationships" xmlns:p="http://schemas.openxmlformats.org/presentationml/2006/main">
+  <p:cSld>
+    <p:spTree>
+      <p:nvGrpSpPr>
+        <p:cNvPr id="1" name=""/>
+        <p:cNvGrpSpPr/>
+        <p:nvPr/>
+      </p:nvGrpSpPr>
+      <p:grpSpPr>
+        <a:xfrm>
+          <a:off x="0" y="0"/>
+          <a:ext cx="0" cy="0"/>
+          <a:chOff x="0" y="0"/>
+          <a:chExt cx="0" cy="0"/>
+        </a:xfrm>
+      </p:grpSpPr>
+      <p:sp>
+        <p:nvSpPr>
+          <p:cNvPr id="2" name="Title 1">
+            <a:extLst>
+              <a:ext uri="{FF2B5EF4-FFF2-40B4-BE49-F238E27FC236}">
                 <a16:creationId xmlns:a16="http://schemas.microsoft.com/office/drawing/2014/main" id="{9CC1ACE9-7D26-4CCC-9796-1B22E0DAD7AD}"/>
               </a:ext>
             </a:extLst>
@@ -3496,7 +3627,212 @@
           <a:p>
             <a:r>
               <a:rPr lang="cs-CZ" dirty="0"/>
-              <a:t>Map – Life – Editor</a:t>
+              <a:t>Pohyb</a:t>
+            </a:r>
+          </a:p>
+          <a:p>
+            <a:pPr lvl="1"/>
+            <a:r>
+              <a:rPr lang="cs-CZ" dirty="0"/>
+              <a:t>Kdy a jak zjišťovat, zda se můžu pohnout?</a:t>
+            </a:r>
+          </a:p>
+          <a:p>
+            <a:pPr lvl="1"/>
+            <a:r>
+              <a:rPr lang="cs-CZ" dirty="0"/>
+              <a:t>Co vracet?</a:t>
+            </a:r>
+          </a:p>
+          <a:p>
+            <a:pPr lvl="1"/>
+            <a:r>
+              <a:rPr lang="cs-CZ" dirty="0"/>
+              <a:t>Kde mít logiku pohybu?</a:t>
+            </a:r>
+          </a:p>
+          <a:p>
+            <a:endParaRPr lang="cs-CZ" dirty="0"/>
+          </a:p>
+          <a:p>
+            <a:endParaRPr lang="cs-CZ" dirty="0"/>
+          </a:p>
+        </p:txBody>
+      </p:sp>
+    </p:spTree>
+    <p:extLst>
+      <p:ext uri="{BB962C8B-B14F-4D97-AF65-F5344CB8AC3E}">
+        <p14:creationId xmlns:p14="http://schemas.microsoft.com/office/powerpoint/2010/main" val="1936753362"/>
+      </p:ext>
+    </p:extLst>
+  </p:cSld>
+  <p:clrMapOvr>
+    <a:masterClrMapping/>
+  </p:clrMapOvr>
+</p:sld>
+</file>
+
+<file path=ppt/slides/slide12.xml><?xml version="1.0" encoding="utf-8"?>
+<p:sld xmlns:a="http://schemas.openxmlformats.org/drawingml/2006/main" xmlns:r="http://schemas.openxmlformats.org/officeDocument/2006/relationships" xmlns:p="http://schemas.openxmlformats.org/presentationml/2006/main">
+  <p:cSld>
+    <p:spTree>
+      <p:nvGrpSpPr>
+        <p:cNvPr id="1" name=""/>
+        <p:cNvGrpSpPr/>
+        <p:nvPr/>
+      </p:nvGrpSpPr>
+      <p:grpSpPr>
+        <a:xfrm>
+          <a:off x="0" y="0"/>
+          <a:ext cx="0" cy="0"/>
+          <a:chOff x="0" y="0"/>
+          <a:chExt cx="0" cy="0"/>
+        </a:xfrm>
+      </p:grpSpPr>
+      <p:sp>
+        <p:nvSpPr>
+          <p:cNvPr id="2" name="Title 1">
+            <a:extLst>
+              <a:ext uri="{FF2B5EF4-FFF2-40B4-BE49-F238E27FC236}">
+                <a16:creationId xmlns:a16="http://schemas.microsoft.com/office/drawing/2014/main" id="{9CC1ACE9-7D26-4CCC-9796-1B22E0DAD7AD}"/>
+              </a:ext>
+            </a:extLst>
+          </p:cNvPr>
+          <p:cNvSpPr>
+            <a:spLocks noGrp="1"/>
+          </p:cNvSpPr>
+          <p:nvPr>
+            <p:ph type="title"/>
+          </p:nvPr>
+        </p:nvSpPr>
+        <p:spPr/>
+        <p:txBody>
+          <a:bodyPr/>
+          <a:lstStyle/>
+          <a:p>
+            <a:r>
+              <a:rPr lang="cs-CZ" u="sng" dirty="0"/>
+              <a:t>Programátorské problémy 2</a:t>
+            </a:r>
+          </a:p>
+        </p:txBody>
+      </p:sp>
+      <p:sp>
+        <p:nvSpPr>
+          <p:cNvPr id="3" name="Content Placeholder 2">
+            <a:extLst>
+              <a:ext uri="{FF2B5EF4-FFF2-40B4-BE49-F238E27FC236}">
+                <a16:creationId xmlns:a16="http://schemas.microsoft.com/office/drawing/2014/main" id="{E962A02A-CBF6-44BF-8C3D-725DE7B4BA2F}"/>
+              </a:ext>
+            </a:extLst>
+          </p:cNvPr>
+          <p:cNvSpPr>
+            <a:spLocks noGrp="1"/>
+          </p:cNvSpPr>
+          <p:nvPr>
+            <p:ph idx="1"/>
+          </p:nvPr>
+        </p:nvSpPr>
+        <p:spPr/>
+        <p:txBody>
+          <a:bodyPr/>
+          <a:lstStyle/>
+          <a:p>
+            <a:r>
+              <a:rPr lang="cs-CZ" dirty="0"/>
+              <a:t>Environment – Life – Editor</a:t>
+            </a:r>
+          </a:p>
+          <a:p>
+            <a:endParaRPr lang="cs-CZ" dirty="0"/>
+          </a:p>
+          <a:p>
+            <a:endParaRPr lang="cs-CZ" dirty="0"/>
+          </a:p>
+        </p:txBody>
+      </p:sp>
+    </p:spTree>
+    <p:extLst>
+      <p:ext uri="{BB962C8B-B14F-4D97-AF65-F5344CB8AC3E}">
+        <p14:creationId xmlns:p14="http://schemas.microsoft.com/office/powerpoint/2010/main" val="3282935121"/>
+      </p:ext>
+    </p:extLst>
+  </p:cSld>
+  <p:clrMapOvr>
+    <a:masterClrMapping/>
+  </p:clrMapOvr>
+</p:sld>
+</file>
+
+<file path=ppt/slides/slide13.xml><?xml version="1.0" encoding="utf-8"?>
+<p:sld xmlns:a="http://schemas.openxmlformats.org/drawingml/2006/main" xmlns:r="http://schemas.openxmlformats.org/officeDocument/2006/relationships" xmlns:p="http://schemas.openxmlformats.org/presentationml/2006/main">
+  <p:cSld>
+    <p:spTree>
+      <p:nvGrpSpPr>
+        <p:cNvPr id="1" name=""/>
+        <p:cNvGrpSpPr/>
+        <p:nvPr/>
+      </p:nvGrpSpPr>
+      <p:grpSpPr>
+        <a:xfrm>
+          <a:off x="0" y="0"/>
+          <a:ext cx="0" cy="0"/>
+          <a:chOff x="0" y="0"/>
+          <a:chExt cx="0" cy="0"/>
+        </a:xfrm>
+      </p:grpSpPr>
+      <p:sp>
+        <p:nvSpPr>
+          <p:cNvPr id="2" name="Title 1">
+            <a:extLst>
+              <a:ext uri="{FF2B5EF4-FFF2-40B4-BE49-F238E27FC236}">
+                <a16:creationId xmlns:a16="http://schemas.microsoft.com/office/drawing/2014/main" id="{9CC1ACE9-7D26-4CCC-9796-1B22E0DAD7AD}"/>
+              </a:ext>
+            </a:extLst>
+          </p:cNvPr>
+          <p:cNvSpPr>
+            <a:spLocks noGrp="1"/>
+          </p:cNvSpPr>
+          <p:nvPr>
+            <p:ph type="title"/>
+          </p:nvPr>
+        </p:nvSpPr>
+        <p:spPr/>
+        <p:txBody>
+          <a:bodyPr/>
+          <a:lstStyle/>
+          <a:p>
+            <a:r>
+              <a:rPr lang="cs-CZ" u="sng" dirty="0"/>
+              <a:t>Programátorské problémy 2</a:t>
+            </a:r>
+          </a:p>
+        </p:txBody>
+      </p:sp>
+      <p:sp>
+        <p:nvSpPr>
+          <p:cNvPr id="3" name="Content Placeholder 2">
+            <a:extLst>
+              <a:ext uri="{FF2B5EF4-FFF2-40B4-BE49-F238E27FC236}">
+                <a16:creationId xmlns:a16="http://schemas.microsoft.com/office/drawing/2014/main" id="{E962A02A-CBF6-44BF-8C3D-725DE7B4BA2F}"/>
+              </a:ext>
+            </a:extLst>
+          </p:cNvPr>
+          <p:cNvSpPr>
+            <a:spLocks noGrp="1"/>
+          </p:cNvSpPr>
+          <p:nvPr>
+            <p:ph idx="1"/>
+          </p:nvPr>
+        </p:nvSpPr>
+        <p:spPr/>
+        <p:txBody>
+          <a:bodyPr/>
+          <a:lstStyle/>
+          <a:p>
+            <a:r>
+              <a:rPr lang="cs-CZ" dirty="0"/>
+              <a:t>Environment – Life – Editor</a:t>
             </a:r>
           </a:p>
           <a:p>
@@ -3587,120 +3923,7 @@
 </p:sld>
 </file>
 
-<file path=ppt/slides/slide11.xml><?xml version="1.0" encoding="utf-8"?>
-<p:sld xmlns:a="http://schemas.openxmlformats.org/drawingml/2006/main" xmlns:r="http://schemas.openxmlformats.org/officeDocument/2006/relationships" xmlns:p="http://schemas.openxmlformats.org/presentationml/2006/main">
-  <p:cSld>
-    <p:spTree>
-      <p:nvGrpSpPr>
-        <p:cNvPr id="1" name=""/>
-        <p:cNvGrpSpPr/>
-        <p:nvPr/>
-      </p:nvGrpSpPr>
-      <p:grpSpPr>
-        <a:xfrm>
-          <a:off x="0" y="0"/>
-          <a:ext cx="0" cy="0"/>
-          <a:chOff x="0" y="0"/>
-          <a:chExt cx="0" cy="0"/>
-        </a:xfrm>
-      </p:grpSpPr>
-      <p:sp>
-        <p:nvSpPr>
-          <p:cNvPr id="2" name="Title 1">
-            <a:extLst>
-              <a:ext uri="{FF2B5EF4-FFF2-40B4-BE49-F238E27FC236}">
-                <a16:creationId xmlns:a16="http://schemas.microsoft.com/office/drawing/2014/main" id="{9CC1ACE9-7D26-4CCC-9796-1B22E0DAD7AD}"/>
-              </a:ext>
-            </a:extLst>
-          </p:cNvPr>
-          <p:cNvSpPr>
-            <a:spLocks noGrp="1"/>
-          </p:cNvSpPr>
-          <p:nvPr>
-            <p:ph type="title"/>
-          </p:nvPr>
-        </p:nvSpPr>
-        <p:spPr/>
-        <p:txBody>
-          <a:bodyPr/>
-          <a:lstStyle/>
-          <a:p>
-            <a:r>
-              <a:rPr lang="cs-CZ" u="sng" dirty="0"/>
-              <a:t>Programátorské problémy 2</a:t>
-            </a:r>
-          </a:p>
-        </p:txBody>
-      </p:sp>
-      <p:sp>
-        <p:nvSpPr>
-          <p:cNvPr id="3" name="Content Placeholder 2">
-            <a:extLst>
-              <a:ext uri="{FF2B5EF4-FFF2-40B4-BE49-F238E27FC236}">
-                <a16:creationId xmlns:a16="http://schemas.microsoft.com/office/drawing/2014/main" id="{E962A02A-CBF6-44BF-8C3D-725DE7B4BA2F}"/>
-              </a:ext>
-            </a:extLst>
-          </p:cNvPr>
-          <p:cNvSpPr>
-            <a:spLocks noGrp="1"/>
-          </p:cNvSpPr>
-          <p:nvPr>
-            <p:ph idx="1"/>
-          </p:nvPr>
-        </p:nvSpPr>
-        <p:spPr/>
-        <p:txBody>
-          <a:bodyPr/>
-          <a:lstStyle/>
-          <a:p>
-            <a:r>
-              <a:rPr lang="cs-CZ" dirty="0"/>
-              <a:t>Pohyb</a:t>
-            </a:r>
-          </a:p>
-          <a:p>
-            <a:pPr lvl="1"/>
-            <a:r>
-              <a:rPr lang="cs-CZ" dirty="0"/>
-              <a:t>Kdy a jak zjišťovat, zda se můžu pohnout?</a:t>
-            </a:r>
-          </a:p>
-          <a:p>
-            <a:pPr lvl="1"/>
-            <a:r>
-              <a:rPr lang="cs-CZ" dirty="0"/>
-              <a:t>Co vracet?</a:t>
-            </a:r>
-          </a:p>
-          <a:p>
-            <a:pPr lvl="1"/>
-            <a:r>
-              <a:rPr lang="cs-CZ" dirty="0"/>
-              <a:t>Kde mít logiku pohybu?</a:t>
-            </a:r>
-          </a:p>
-          <a:p>
-            <a:endParaRPr lang="cs-CZ" dirty="0"/>
-          </a:p>
-          <a:p>
-            <a:endParaRPr lang="cs-CZ" dirty="0"/>
-          </a:p>
-        </p:txBody>
-      </p:sp>
-    </p:spTree>
-    <p:extLst>
-      <p:ext uri="{BB962C8B-B14F-4D97-AF65-F5344CB8AC3E}">
-        <p14:creationId xmlns:p14="http://schemas.microsoft.com/office/powerpoint/2010/main" val="1936753362"/>
-      </p:ext>
-    </p:extLst>
-  </p:cSld>
-  <p:clrMapOvr>
-    <a:masterClrMapping/>
-  </p:clrMapOvr>
-</p:sld>
-</file>
-
-<file path=ppt/slides/slide12.xml><?xml version="1.0" encoding="utf-8"?>
+<file path=ppt/slides/slide14.xml><?xml version="1.0" encoding="utf-8"?>
 <p:sld xmlns:a="http://schemas.openxmlformats.org/drawingml/2006/main" xmlns:r="http://schemas.openxmlformats.org/officeDocument/2006/relationships" xmlns:p="http://schemas.openxmlformats.org/presentationml/2006/main">
   <p:cSld>
     <p:spTree>
@@ -3811,10 +4034,10 @@
       </p:pic>
       <p:pic>
         <p:nvPicPr>
-          <p:cNvPr id="5" name="Picture 4">
-            <a:extLst>
-              <a:ext uri="{FF2B5EF4-FFF2-40B4-BE49-F238E27FC236}">
-                <a16:creationId xmlns:a16="http://schemas.microsoft.com/office/drawing/2014/main" id="{9276D792-1277-46F1-860B-9DA223815BEB}"/>
+          <p:cNvPr id="6" name="Picture 5">
+            <a:extLst>
+              <a:ext uri="{FF2B5EF4-FFF2-40B4-BE49-F238E27FC236}">
+                <a16:creationId xmlns:a16="http://schemas.microsoft.com/office/drawing/2014/main" id="{D13082BE-6BEC-4DBA-B0C9-5F6E2E790CEC}"/>
               </a:ext>
             </a:extLst>
           </p:cNvPr>
@@ -3831,8 +4054,8 @@
         </p:blipFill>
         <p:spPr>
           <a:xfrm>
-            <a:off x="1343025" y="3699729"/>
-            <a:ext cx="4752975" cy="2409825"/>
+            <a:off x="1394899" y="2866291"/>
+            <a:ext cx="4591050" cy="3676650"/>
           </a:xfrm>
           <a:prstGeom prst="rect">
             <a:avLst/>
@@ -3852,7 +4075,7 @@
 </p:sld>
 </file>
 
-<file path=ppt/slides/slide13.xml><?xml version="1.0" encoding="utf-8"?>
+<file path=ppt/slides/slide15.xml><?xml version="1.0" encoding="utf-8"?>
 <p:sld xmlns:a="http://schemas.openxmlformats.org/drawingml/2006/main" xmlns:r="http://schemas.openxmlformats.org/officeDocument/2006/relationships" xmlns:p="http://schemas.openxmlformats.org/presentationml/2006/main">
   <p:cSld>
     <p:spTree>
@@ -4846,12 +5069,47 @@
           <a:chExt cx="0" cy="0"/>
         </a:xfrm>
       </p:grpSpPr>
+      <p:pic>
+        <p:nvPicPr>
+          <p:cNvPr id="13" name="Content Placeholder 12" descr="A close up of a piece of paper&#10;&#10;Description automatically generated">
+            <a:extLst>
+              <a:ext uri="{FF2B5EF4-FFF2-40B4-BE49-F238E27FC236}">
+                <a16:creationId xmlns:a16="http://schemas.microsoft.com/office/drawing/2014/main" id="{A39FC8B5-A73D-4312-8CAE-6E19377AB5CA}"/>
+              </a:ext>
+            </a:extLst>
+          </p:cNvPr>
+          <p:cNvPicPr>
+            <a:picLocks noGrp="1" noChangeAspect="1"/>
+          </p:cNvPicPr>
+          <p:nvPr>
+            <p:ph idx="1"/>
+          </p:nvPr>
+        </p:nvPicPr>
+        <p:blipFill>
+          <a:blip r:embed="rId2">
+            <a:extLst>
+              <a:ext uri="{28A0092B-C50C-407E-A947-70E740481C1C}">
+                <a14:useLocalDpi xmlns:a14="http://schemas.microsoft.com/office/drawing/2010/main" val="0"/>
+              </a:ext>
+            </a:extLst>
+          </a:blip>
+          <a:stretch>
+            <a:fillRect/>
+          </a:stretch>
+        </p:blipFill>
+        <p:spPr>
+          <a:xfrm>
+            <a:off x="2737340" y="1121626"/>
+            <a:ext cx="8405812" cy="5480945"/>
+          </a:xfrm>
+        </p:spPr>
+      </p:pic>
       <p:sp>
         <p:nvSpPr>
           <p:cNvPr id="2" name="Title 1">
             <a:extLst>
               <a:ext uri="{FF2B5EF4-FFF2-40B4-BE49-F238E27FC236}">
-                <a16:creationId xmlns:a16="http://schemas.microsoft.com/office/drawing/2014/main" id="{9CC1ACE9-7D26-4CCC-9796-1B22E0DAD7AD}"/>
+                <a16:creationId xmlns:a16="http://schemas.microsoft.com/office/drawing/2014/main" id="{350C91FF-9468-4D16-93AD-3DE88B5C0596}"/>
               </a:ext>
             </a:extLst>
           </p:cNvPr>
@@ -4869,49 +5127,15 @@
           <a:p>
             <a:r>
               <a:rPr lang="cs-CZ" u="sng" dirty="0"/>
-              <a:t>Programátorské problémy 1</a:t>
-            </a:r>
-          </a:p>
-        </p:txBody>
-      </p:sp>
-      <p:sp>
-        <p:nvSpPr>
-          <p:cNvPr id="3" name="Content Placeholder 2">
-            <a:extLst>
-              <a:ext uri="{FF2B5EF4-FFF2-40B4-BE49-F238E27FC236}">
-                <a16:creationId xmlns:a16="http://schemas.microsoft.com/office/drawing/2014/main" id="{E962A02A-CBF6-44BF-8C3D-725DE7B4BA2F}"/>
-              </a:ext>
-            </a:extLst>
-          </p:cNvPr>
-          <p:cNvSpPr>
-            <a:spLocks noGrp="1"/>
-          </p:cNvSpPr>
-          <p:nvPr>
-            <p:ph idx="1"/>
-          </p:nvPr>
-        </p:nvSpPr>
-        <p:spPr/>
-        <p:txBody>
-          <a:bodyPr/>
-          <a:lstStyle/>
-          <a:p>
-            <a:r>
-              <a:rPr lang="cs-CZ" dirty="0"/>
-              <a:t>Map – Life – Editor</a:t>
-            </a:r>
-          </a:p>
-          <a:p>
-            <a:endParaRPr lang="cs-CZ" dirty="0"/>
-          </a:p>
-          <a:p>
-            <a:endParaRPr lang="cs-CZ" dirty="0"/>
+              <a:t>Architektura 1</a:t>
+            </a:r>
           </a:p>
         </p:txBody>
       </p:sp>
     </p:spTree>
     <p:extLst>
       <p:ext uri="{BB962C8B-B14F-4D97-AF65-F5344CB8AC3E}">
-        <p14:creationId xmlns:p14="http://schemas.microsoft.com/office/powerpoint/2010/main" val="3282935121"/>
+        <p14:creationId xmlns:p14="http://schemas.microsoft.com/office/powerpoint/2010/main" val="1361111916"/>
       </p:ext>
     </p:extLst>
   </p:cSld>

</xml_diff>

<commit_message>
In editor, there now is the EditorObject<T> class, that takes the place of Labels there. In consequence of this I made Renamed ILifeFactory to IObjFactory.
Almost everything is now generic in the editor.

Theese Factories are now in a separate file.

Also Tickers were moved to a separete file.
</commit_message>
<xml_diff>
--- a/Specification_and_Documantation_and_presentation/Prezentace programu.pptx
+++ b/Specification_and_Documantation_and_presentation/Prezentace programu.pptx
@@ -275,7 +275,7 @@
           <a:p>
             <a:fld id="{75C513EA-4B5C-411F-A227-EDE4A8280FE5}" type="datetimeFigureOut">
               <a:rPr lang="cs-CZ" smtClean="0"/>
-              <a:t>22.9.2019</a:t>
+              <a:t>23.9.2019</a:t>
             </a:fld>
             <a:endParaRPr lang="cs-CZ"/>
           </a:p>
@@ -475,7 +475,7 @@
           <a:p>
             <a:fld id="{75C513EA-4B5C-411F-A227-EDE4A8280FE5}" type="datetimeFigureOut">
               <a:rPr lang="cs-CZ" smtClean="0"/>
-              <a:t>22.9.2019</a:t>
+              <a:t>23.9.2019</a:t>
             </a:fld>
             <a:endParaRPr lang="cs-CZ"/>
           </a:p>
@@ -685,7 +685,7 @@
           <a:p>
             <a:fld id="{75C513EA-4B5C-411F-A227-EDE4A8280FE5}" type="datetimeFigureOut">
               <a:rPr lang="cs-CZ" smtClean="0"/>
-              <a:t>22.9.2019</a:t>
+              <a:t>23.9.2019</a:t>
             </a:fld>
             <a:endParaRPr lang="cs-CZ"/>
           </a:p>
@@ -885,7 +885,7 @@
           <a:p>
             <a:fld id="{75C513EA-4B5C-411F-A227-EDE4A8280FE5}" type="datetimeFigureOut">
               <a:rPr lang="cs-CZ" smtClean="0"/>
-              <a:t>22.9.2019</a:t>
+              <a:t>23.9.2019</a:t>
             </a:fld>
             <a:endParaRPr lang="cs-CZ"/>
           </a:p>
@@ -1161,7 +1161,7 @@
           <a:p>
             <a:fld id="{75C513EA-4B5C-411F-A227-EDE4A8280FE5}" type="datetimeFigureOut">
               <a:rPr lang="cs-CZ" smtClean="0"/>
-              <a:t>22.9.2019</a:t>
+              <a:t>23.9.2019</a:t>
             </a:fld>
             <a:endParaRPr lang="cs-CZ"/>
           </a:p>
@@ -1429,7 +1429,7 @@
           <a:p>
             <a:fld id="{75C513EA-4B5C-411F-A227-EDE4A8280FE5}" type="datetimeFigureOut">
               <a:rPr lang="cs-CZ" smtClean="0"/>
-              <a:t>22.9.2019</a:t>
+              <a:t>23.9.2019</a:t>
             </a:fld>
             <a:endParaRPr lang="cs-CZ"/>
           </a:p>
@@ -1844,7 +1844,7 @@
           <a:p>
             <a:fld id="{75C513EA-4B5C-411F-A227-EDE4A8280FE5}" type="datetimeFigureOut">
               <a:rPr lang="cs-CZ" smtClean="0"/>
-              <a:t>22.9.2019</a:t>
+              <a:t>23.9.2019</a:t>
             </a:fld>
             <a:endParaRPr lang="cs-CZ"/>
           </a:p>
@@ -1986,7 +1986,7 @@
           <a:p>
             <a:fld id="{75C513EA-4B5C-411F-A227-EDE4A8280FE5}" type="datetimeFigureOut">
               <a:rPr lang="cs-CZ" smtClean="0"/>
-              <a:t>22.9.2019</a:t>
+              <a:t>23.9.2019</a:t>
             </a:fld>
             <a:endParaRPr lang="cs-CZ"/>
           </a:p>
@@ -2099,7 +2099,7 @@
           <a:p>
             <a:fld id="{75C513EA-4B5C-411F-A227-EDE4A8280FE5}" type="datetimeFigureOut">
               <a:rPr lang="cs-CZ" smtClean="0"/>
-              <a:t>22.9.2019</a:t>
+              <a:t>23.9.2019</a:t>
             </a:fld>
             <a:endParaRPr lang="cs-CZ"/>
           </a:p>
@@ -2412,7 +2412,7 @@
           <a:p>
             <a:fld id="{75C513EA-4B5C-411F-A227-EDE4A8280FE5}" type="datetimeFigureOut">
               <a:rPr lang="cs-CZ" smtClean="0"/>
-              <a:t>22.9.2019</a:t>
+              <a:t>23.9.2019</a:t>
             </a:fld>
             <a:endParaRPr lang="cs-CZ"/>
           </a:p>
@@ -2701,7 +2701,7 @@
           <a:p>
             <a:fld id="{75C513EA-4B5C-411F-A227-EDE4A8280FE5}" type="datetimeFigureOut">
               <a:rPr lang="cs-CZ" smtClean="0"/>
-              <a:t>22.9.2019</a:t>
+              <a:t>23.9.2019</a:t>
             </a:fld>
             <a:endParaRPr lang="cs-CZ"/>
           </a:p>
@@ -2944,7 +2944,7 @@
           <a:p>
             <a:fld id="{75C513EA-4B5C-411F-A227-EDE4A8280FE5}" type="datetimeFigureOut">
               <a:rPr lang="cs-CZ" smtClean="0"/>
-              <a:t>22.9.2019</a:t>
+              <a:t>23.9.2019</a:t>
             </a:fld>
             <a:endParaRPr lang="cs-CZ"/>
           </a:p>
@@ -3852,10 +3852,10 @@
       </p:sp>
       <p:pic>
         <p:nvPicPr>
-          <p:cNvPr id="4" name="Picture 3">
-            <a:extLst>
-              <a:ext uri="{FF2B5EF4-FFF2-40B4-BE49-F238E27FC236}">
-                <a16:creationId xmlns:a16="http://schemas.microsoft.com/office/drawing/2014/main" id="{72036659-6EBA-4752-8545-BFEB4454B3B8}"/>
+          <p:cNvPr id="6" name="Picture 5">
+            <a:extLst>
+              <a:ext uri="{FF2B5EF4-FFF2-40B4-BE49-F238E27FC236}">
+                <a16:creationId xmlns:a16="http://schemas.microsoft.com/office/drawing/2014/main" id="{0616E266-BED2-4BCE-8993-BB69BEA24855}"/>
               </a:ext>
             </a:extLst>
           </p:cNvPr>
@@ -3872,8 +3872,8 @@
         </p:blipFill>
         <p:spPr>
           <a:xfrm>
-            <a:off x="5522369" y="1662113"/>
-            <a:ext cx="6429375" cy="4514850"/>
+            <a:off x="109261" y="3016251"/>
+            <a:ext cx="5356837" cy="3267413"/>
           </a:xfrm>
           <a:prstGeom prst="rect">
             <a:avLst/>
@@ -3882,10 +3882,10 @@
       </p:pic>
       <p:pic>
         <p:nvPicPr>
-          <p:cNvPr id="5" name="Picture 4">
-            <a:extLst>
-              <a:ext uri="{FF2B5EF4-FFF2-40B4-BE49-F238E27FC236}">
-                <a16:creationId xmlns:a16="http://schemas.microsoft.com/office/drawing/2014/main" id="{37A87859-538F-4A30-A1D1-0CC3E40D5FCB}"/>
+          <p:cNvPr id="9" name="Picture 8">
+            <a:extLst>
+              <a:ext uri="{FF2B5EF4-FFF2-40B4-BE49-F238E27FC236}">
+                <a16:creationId xmlns:a16="http://schemas.microsoft.com/office/drawing/2014/main" id="{D074BFBC-47B3-48EB-89CF-3094A7FD7137}"/>
               </a:ext>
             </a:extLst>
           </p:cNvPr>
@@ -3902,8 +3902,8 @@
         </p:blipFill>
         <p:spPr>
           <a:xfrm>
-            <a:off x="165532" y="3392219"/>
-            <a:ext cx="5356837" cy="2919681"/>
+            <a:off x="5466098" y="1690688"/>
+            <a:ext cx="6562530" cy="4351339"/>
           </a:xfrm>
           <a:prstGeom prst="rect">
             <a:avLst/>

</xml_diff>

<commit_message>
Names of files changed to paths.
Location.PseudoNormalize() was moved to Movement as an extesinon method.

StrightMovement was moved to the NotLife folder.

Documentation and prezentation were updated.
</commit_message>
<xml_diff>
--- a/Specification_and_Documantation_and_presentation/Prezentace programu.pptx
+++ b/Specification_and_Documantation_and_presentation/Prezentace programu.pptx
@@ -15,11 +15,13 @@
     <p:sldId id="269" r:id="rId9"/>
     <p:sldId id="270" r:id="rId10"/>
     <p:sldId id="271" r:id="rId11"/>
-    <p:sldId id="264" r:id="rId12"/>
-    <p:sldId id="263" r:id="rId13"/>
-    <p:sldId id="267" r:id="rId14"/>
-    <p:sldId id="266" r:id="rId15"/>
-    <p:sldId id="268" r:id="rId16"/>
+    <p:sldId id="273" r:id="rId12"/>
+    <p:sldId id="264" r:id="rId13"/>
+    <p:sldId id="263" r:id="rId14"/>
+    <p:sldId id="267" r:id="rId15"/>
+    <p:sldId id="266" r:id="rId16"/>
+    <p:sldId id="272" r:id="rId17"/>
+    <p:sldId id="268" r:id="rId18"/>
   </p:sldIdLst>
   <p:sldSz cx="12192000" cy="6858000"/>
   <p:notesSz cx="6858000" cy="9144000"/>
@@ -3477,19 +3479,17 @@
       </p:sp>
       <p:pic>
         <p:nvPicPr>
-          <p:cNvPr id="9" name="Content Placeholder 8" descr="A screenshot of a video game&#10;&#10;Description automatically generated">
-            <a:extLst>
-              <a:ext uri="{FF2B5EF4-FFF2-40B4-BE49-F238E27FC236}">
-                <a16:creationId xmlns:a16="http://schemas.microsoft.com/office/drawing/2014/main" id="{127AFFFD-1000-457D-9EF7-E6FBCCE241C7}"/>
+          <p:cNvPr id="12" name="Picture 11">
+            <a:extLst>
+              <a:ext uri="{FF2B5EF4-FFF2-40B4-BE49-F238E27FC236}">
+                <a16:creationId xmlns:a16="http://schemas.microsoft.com/office/drawing/2014/main" id="{108F0E47-838C-4B36-9BDA-B03D91494DB8}"/>
               </a:ext>
             </a:extLst>
           </p:cNvPr>
           <p:cNvPicPr>
-            <a:picLocks noGrp="1" noChangeAspect="1"/>
+            <a:picLocks noChangeAspect="1"/>
           </p:cNvPicPr>
-          <p:nvPr>
-            <p:ph idx="1"/>
-          </p:nvPr>
+          <p:nvPr/>
         </p:nvPicPr>
         <p:blipFill>
           <a:blip r:embed="rId2">
@@ -3505,40 +3505,7 @@
         </p:blipFill>
         <p:spPr>
           <a:xfrm>
-            <a:off x="4843609" y="525095"/>
-            <a:ext cx="6753225" cy="1724025"/>
-          </a:xfrm>
-        </p:spPr>
-      </p:pic>
-      <p:pic>
-        <p:nvPicPr>
-          <p:cNvPr id="12" name="Picture 11">
-            <a:extLst>
-              <a:ext uri="{FF2B5EF4-FFF2-40B4-BE49-F238E27FC236}">
-                <a16:creationId xmlns:a16="http://schemas.microsoft.com/office/drawing/2014/main" id="{108F0E47-838C-4B36-9BDA-B03D91494DB8}"/>
-              </a:ext>
-            </a:extLst>
-          </p:cNvPr>
-          <p:cNvPicPr>
-            <a:picLocks noChangeAspect="1"/>
-          </p:cNvPicPr>
-          <p:nvPr/>
-        </p:nvPicPr>
-        <p:blipFill>
-          <a:blip r:embed="rId3">
-            <a:extLst>
-              <a:ext uri="{28A0092B-C50C-407E-A947-70E740481C1C}">
-                <a14:useLocalDpi xmlns:a14="http://schemas.microsoft.com/office/drawing/2010/main" val="0"/>
-              </a:ext>
-            </a:extLst>
-          </a:blip>
-          <a:stretch>
-            <a:fillRect/>
-          </a:stretch>
-        </p:blipFill>
-        <p:spPr>
-          <a:xfrm>
-            <a:off x="627184" y="2694355"/>
+            <a:off x="2519362" y="2173850"/>
             <a:ext cx="7153275" cy="3638550"/>
           </a:xfrm>
           <a:prstGeom prst="rect">
@@ -3581,7 +3548,7 @@
           <p:cNvPr id="2" name="Title 1">
             <a:extLst>
               <a:ext uri="{FF2B5EF4-FFF2-40B4-BE49-F238E27FC236}">
-                <a16:creationId xmlns:a16="http://schemas.microsoft.com/office/drawing/2014/main" id="{9CC1ACE9-7D26-4CCC-9796-1B22E0DAD7AD}"/>
+                <a16:creationId xmlns:a16="http://schemas.microsoft.com/office/drawing/2014/main" id="{57C8FE5D-E5CF-4D75-B37F-E9AC2B6F7DBD}"/>
               </a:ext>
             </a:extLst>
           </p:cNvPr>
@@ -3599,70 +3566,50 @@
           <a:p>
             <a:r>
               <a:rPr lang="cs-CZ" u="sng" dirty="0"/>
-              <a:t>Programátorské problémy 1</a:t>
-            </a:r>
-          </a:p>
-        </p:txBody>
-      </p:sp>
-      <p:sp>
-        <p:nvSpPr>
-          <p:cNvPr id="3" name="Content Placeholder 2">
-            <a:extLst>
-              <a:ext uri="{FF2B5EF4-FFF2-40B4-BE49-F238E27FC236}">
-                <a16:creationId xmlns:a16="http://schemas.microsoft.com/office/drawing/2014/main" id="{E962A02A-CBF6-44BF-8C3D-725DE7B4BA2F}"/>
-              </a:ext>
-            </a:extLst>
-          </p:cNvPr>
-          <p:cNvSpPr>
-            <a:spLocks noGrp="1"/>
-          </p:cNvSpPr>
+              <a:t>Architektura 3</a:t>
+            </a:r>
+          </a:p>
+        </p:txBody>
+      </p:sp>
+      <p:pic>
+        <p:nvPicPr>
+          <p:cNvPr id="4" name="Content Placeholder 8" descr="A screenshot of a video game&#10;&#10;Description automatically generated">
+            <a:extLst>
+              <a:ext uri="{FF2B5EF4-FFF2-40B4-BE49-F238E27FC236}">
+                <a16:creationId xmlns:a16="http://schemas.microsoft.com/office/drawing/2014/main" id="{ADB1072D-64F2-4E95-BE9A-CF4EE7650063}"/>
+              </a:ext>
+            </a:extLst>
+          </p:cNvPr>
+          <p:cNvPicPr>
+            <a:picLocks noGrp="1" noChangeAspect="1"/>
+          </p:cNvPicPr>
           <p:nvPr>
             <p:ph idx="1"/>
           </p:nvPr>
-        </p:nvSpPr>
-        <p:spPr/>
-        <p:txBody>
-          <a:bodyPr/>
-          <a:lstStyle/>
-          <a:p>
-            <a:r>
-              <a:rPr lang="cs-CZ" dirty="0"/>
-              <a:t>Pohyb</a:t>
-            </a:r>
-          </a:p>
-          <a:p>
-            <a:pPr lvl="1"/>
-            <a:r>
-              <a:rPr lang="cs-CZ" dirty="0"/>
-              <a:t>Kdy a jak zjišťovat, zda se můžu pohnout?</a:t>
-            </a:r>
-          </a:p>
-          <a:p>
-            <a:pPr lvl="1"/>
-            <a:r>
-              <a:rPr lang="cs-CZ" dirty="0"/>
-              <a:t>Co vracet?</a:t>
-            </a:r>
-          </a:p>
-          <a:p>
-            <a:pPr lvl="1"/>
-            <a:r>
-              <a:rPr lang="cs-CZ" dirty="0"/>
-              <a:t>Kde mít logiku pohybu?</a:t>
-            </a:r>
-          </a:p>
-          <a:p>
-            <a:endParaRPr lang="cs-CZ" dirty="0"/>
-          </a:p>
-          <a:p>
-            <a:endParaRPr lang="cs-CZ" dirty="0"/>
-          </a:p>
-        </p:txBody>
-      </p:sp>
+        </p:nvPicPr>
+        <p:blipFill>
+          <a:blip r:embed="rId2">
+            <a:extLst>
+              <a:ext uri="{28A0092B-C50C-407E-A947-70E740481C1C}">
+                <a14:useLocalDpi xmlns:a14="http://schemas.microsoft.com/office/drawing/2010/main" val="0"/>
+              </a:ext>
+            </a:extLst>
+          </a:blip>
+          <a:stretch>
+            <a:fillRect/>
+          </a:stretch>
+        </p:blipFill>
+        <p:spPr>
+          <a:xfrm>
+            <a:off x="2550575" y="2773521"/>
+            <a:ext cx="6753225" cy="1724025"/>
+          </a:xfrm>
+        </p:spPr>
+      </p:pic>
     </p:spTree>
     <p:extLst>
       <p:ext uri="{BB962C8B-B14F-4D97-AF65-F5344CB8AC3E}">
-        <p14:creationId xmlns:p14="http://schemas.microsoft.com/office/powerpoint/2010/main" val="1936753362"/>
+        <p14:creationId xmlns:p14="http://schemas.microsoft.com/office/powerpoint/2010/main" val="1089340185"/>
       </p:ext>
     </p:extLst>
   </p:cSld>
@@ -3712,6 +3659,119 @@
           <a:p>
             <a:r>
               <a:rPr lang="cs-CZ" u="sng" dirty="0"/>
+              <a:t>Programátorské problémy 1</a:t>
+            </a:r>
+          </a:p>
+        </p:txBody>
+      </p:sp>
+      <p:sp>
+        <p:nvSpPr>
+          <p:cNvPr id="3" name="Content Placeholder 2">
+            <a:extLst>
+              <a:ext uri="{FF2B5EF4-FFF2-40B4-BE49-F238E27FC236}">
+                <a16:creationId xmlns:a16="http://schemas.microsoft.com/office/drawing/2014/main" id="{E962A02A-CBF6-44BF-8C3D-725DE7B4BA2F}"/>
+              </a:ext>
+            </a:extLst>
+          </p:cNvPr>
+          <p:cNvSpPr>
+            <a:spLocks noGrp="1"/>
+          </p:cNvSpPr>
+          <p:nvPr>
+            <p:ph idx="1"/>
+          </p:nvPr>
+        </p:nvSpPr>
+        <p:spPr/>
+        <p:txBody>
+          <a:bodyPr/>
+          <a:lstStyle/>
+          <a:p>
+            <a:r>
+              <a:rPr lang="cs-CZ" dirty="0"/>
+              <a:t>Pohyb</a:t>
+            </a:r>
+          </a:p>
+          <a:p>
+            <a:pPr lvl="1"/>
+            <a:r>
+              <a:rPr lang="cs-CZ" dirty="0"/>
+              <a:t>Kdy a jak zjišťovat, zda se můžu pohnout?</a:t>
+            </a:r>
+          </a:p>
+          <a:p>
+            <a:pPr lvl="1"/>
+            <a:r>
+              <a:rPr lang="cs-CZ" dirty="0"/>
+              <a:t>Co vracet?</a:t>
+            </a:r>
+          </a:p>
+          <a:p>
+            <a:pPr lvl="1"/>
+            <a:r>
+              <a:rPr lang="cs-CZ" dirty="0"/>
+              <a:t>Kde mít logiku pohybu?</a:t>
+            </a:r>
+          </a:p>
+          <a:p>
+            <a:endParaRPr lang="cs-CZ" dirty="0"/>
+          </a:p>
+          <a:p>
+            <a:endParaRPr lang="cs-CZ" dirty="0"/>
+          </a:p>
+        </p:txBody>
+      </p:sp>
+    </p:spTree>
+    <p:extLst>
+      <p:ext uri="{BB962C8B-B14F-4D97-AF65-F5344CB8AC3E}">
+        <p14:creationId xmlns:p14="http://schemas.microsoft.com/office/powerpoint/2010/main" val="1936753362"/>
+      </p:ext>
+    </p:extLst>
+  </p:cSld>
+  <p:clrMapOvr>
+    <a:masterClrMapping/>
+  </p:clrMapOvr>
+</p:sld>
+</file>
+
+<file path=ppt/slides/slide13.xml><?xml version="1.0" encoding="utf-8"?>
+<p:sld xmlns:a="http://schemas.openxmlformats.org/drawingml/2006/main" xmlns:r="http://schemas.openxmlformats.org/officeDocument/2006/relationships" xmlns:p="http://schemas.openxmlformats.org/presentationml/2006/main">
+  <p:cSld>
+    <p:spTree>
+      <p:nvGrpSpPr>
+        <p:cNvPr id="1" name=""/>
+        <p:cNvGrpSpPr/>
+        <p:nvPr/>
+      </p:nvGrpSpPr>
+      <p:grpSpPr>
+        <a:xfrm>
+          <a:off x="0" y="0"/>
+          <a:ext cx="0" cy="0"/>
+          <a:chOff x="0" y="0"/>
+          <a:chExt cx="0" cy="0"/>
+        </a:xfrm>
+      </p:grpSpPr>
+      <p:sp>
+        <p:nvSpPr>
+          <p:cNvPr id="2" name="Title 1">
+            <a:extLst>
+              <a:ext uri="{FF2B5EF4-FFF2-40B4-BE49-F238E27FC236}">
+                <a16:creationId xmlns:a16="http://schemas.microsoft.com/office/drawing/2014/main" id="{9CC1ACE9-7D26-4CCC-9796-1B22E0DAD7AD}"/>
+              </a:ext>
+            </a:extLst>
+          </p:cNvPr>
+          <p:cNvSpPr>
+            <a:spLocks noGrp="1"/>
+          </p:cNvSpPr>
+          <p:nvPr>
+            <p:ph type="title"/>
+          </p:nvPr>
+        </p:nvSpPr>
+        <p:spPr/>
+        <p:txBody>
+          <a:bodyPr/>
+          <a:lstStyle/>
+          <a:p>
+            <a:r>
+              <a:rPr lang="cs-CZ" u="sng" dirty="0"/>
               <a:t>Programátorské problémy 2</a:t>
             </a:r>
           </a:p>
@@ -3764,7 +3824,7 @@
 </p:sld>
 </file>
 
-<file path=ppt/slides/slide13.xml><?xml version="1.0" encoding="utf-8"?>
+<file path=ppt/slides/slide14.xml><?xml version="1.0" encoding="utf-8"?>
 <p:sld xmlns:a="http://schemas.openxmlformats.org/drawingml/2006/main" xmlns:r="http://schemas.openxmlformats.org/officeDocument/2006/relationships" xmlns:p="http://schemas.openxmlformats.org/presentationml/2006/main">
   <p:cSld>
     <p:spTree>
@@ -3923,7 +3983,7 @@
 </p:sld>
 </file>
 
-<file path=ppt/slides/slide14.xml><?xml version="1.0" encoding="utf-8"?>
+<file path=ppt/slides/slide15.xml><?xml version="1.0" encoding="utf-8"?>
 <p:sld xmlns:a="http://schemas.openxmlformats.org/drawingml/2006/main" xmlns:r="http://schemas.openxmlformats.org/officeDocument/2006/relationships" xmlns:p="http://schemas.openxmlformats.org/presentationml/2006/main">
   <p:cSld>
     <p:spTree>
@@ -4075,7 +4135,243 @@
 </p:sld>
 </file>
 
-<file path=ppt/slides/slide15.xml><?xml version="1.0" encoding="utf-8"?>
+<file path=ppt/slides/slide16.xml><?xml version="1.0" encoding="utf-8"?>
+<p:sld xmlns:a="http://schemas.openxmlformats.org/drawingml/2006/main" xmlns:r="http://schemas.openxmlformats.org/officeDocument/2006/relationships" xmlns:p="http://schemas.openxmlformats.org/presentationml/2006/main">
+  <p:cSld>
+    <p:spTree>
+      <p:nvGrpSpPr>
+        <p:cNvPr id="1" name=""/>
+        <p:cNvGrpSpPr/>
+        <p:nvPr/>
+      </p:nvGrpSpPr>
+      <p:grpSpPr>
+        <a:xfrm>
+          <a:off x="0" y="0"/>
+          <a:ext cx="0" cy="0"/>
+          <a:chOff x="0" y="0"/>
+          <a:chExt cx="0" cy="0"/>
+        </a:xfrm>
+      </p:grpSpPr>
+      <p:sp>
+        <p:nvSpPr>
+          <p:cNvPr id="2" name="Title 1">
+            <a:extLst>
+              <a:ext uri="{FF2B5EF4-FFF2-40B4-BE49-F238E27FC236}">
+                <a16:creationId xmlns:a16="http://schemas.microsoft.com/office/drawing/2014/main" id="{52354CEE-553B-4A26-8329-A6FBADCF66E6}"/>
+              </a:ext>
+            </a:extLst>
+          </p:cNvPr>
+          <p:cNvSpPr>
+            <a:spLocks noGrp="1"/>
+          </p:cNvSpPr>
+          <p:nvPr>
+            <p:ph type="title"/>
+          </p:nvPr>
+        </p:nvSpPr>
+        <p:spPr/>
+        <p:txBody>
+          <a:bodyPr/>
+          <a:lstStyle/>
+          <a:p>
+            <a:r>
+              <a:rPr lang="cs-CZ" u="sng" dirty="0"/>
+              <a:t>Programátorské problémy 4</a:t>
+            </a:r>
+          </a:p>
+        </p:txBody>
+      </p:sp>
+      <p:sp>
+        <p:nvSpPr>
+          <p:cNvPr id="3" name="Content Placeholder 2">
+            <a:extLst>
+              <a:ext uri="{FF2B5EF4-FFF2-40B4-BE49-F238E27FC236}">
+                <a16:creationId xmlns:a16="http://schemas.microsoft.com/office/drawing/2014/main" id="{07F477D9-0DC0-47AA-AD4F-3182189B11C2}"/>
+              </a:ext>
+            </a:extLst>
+          </p:cNvPr>
+          <p:cNvSpPr>
+            <a:spLocks noGrp="1"/>
+          </p:cNvSpPr>
+          <p:nvPr>
+            <p:ph idx="1"/>
+          </p:nvPr>
+        </p:nvSpPr>
+        <p:spPr/>
+        <p:txBody>
+          <a:bodyPr/>
+          <a:lstStyle/>
+          <a:p>
+            <a:r>
+              <a:rPr lang="cs-CZ" dirty="0"/>
+              <a:t>Location.Normalize()</a:t>
+            </a:r>
+          </a:p>
+        </p:txBody>
+      </p:sp>
+      <p:pic>
+        <p:nvPicPr>
+          <p:cNvPr id="4" name="Picture 3">
+            <a:extLst>
+              <a:ext uri="{FF2B5EF4-FFF2-40B4-BE49-F238E27FC236}">
+                <a16:creationId xmlns:a16="http://schemas.microsoft.com/office/drawing/2014/main" id="{1B38160F-9C55-4B27-BD11-A8780D664EB5}"/>
+              </a:ext>
+            </a:extLst>
+          </p:cNvPr>
+          <p:cNvPicPr>
+            <a:picLocks noChangeAspect="1"/>
+          </p:cNvPicPr>
+          <p:nvPr/>
+        </p:nvPicPr>
+        <p:blipFill>
+          <a:blip r:embed="rId2"/>
+          <a:stretch>
+            <a:fillRect/>
+          </a:stretch>
+        </p:blipFill>
+        <p:spPr>
+          <a:xfrm>
+            <a:off x="5780502" y="4190035"/>
+            <a:ext cx="5953125" cy="2476500"/>
+          </a:xfrm>
+          <a:prstGeom prst="rect">
+            <a:avLst/>
+          </a:prstGeom>
+        </p:spPr>
+      </p:pic>
+      <p:pic>
+        <p:nvPicPr>
+          <p:cNvPr id="5" name="Picture 4">
+            <a:extLst>
+              <a:ext uri="{FF2B5EF4-FFF2-40B4-BE49-F238E27FC236}">
+                <a16:creationId xmlns:a16="http://schemas.microsoft.com/office/drawing/2014/main" id="{A178163B-DEE1-4D0F-BCBA-4321A0ED11C1}"/>
+              </a:ext>
+            </a:extLst>
+          </p:cNvPr>
+          <p:cNvPicPr>
+            <a:picLocks noChangeAspect="1"/>
+          </p:cNvPicPr>
+          <p:nvPr/>
+        </p:nvPicPr>
+        <p:blipFill>
+          <a:blip r:embed="rId3"/>
+          <a:stretch>
+            <a:fillRect/>
+          </a:stretch>
+        </p:blipFill>
+        <p:spPr>
+          <a:xfrm>
+            <a:off x="838200" y="2966146"/>
+            <a:ext cx="4048125" cy="1676400"/>
+          </a:xfrm>
+          <a:prstGeom prst="rect">
+            <a:avLst/>
+          </a:prstGeom>
+        </p:spPr>
+      </p:pic>
+      <p:pic>
+        <p:nvPicPr>
+          <p:cNvPr id="6" name="Picture 5">
+            <a:extLst>
+              <a:ext uri="{FF2B5EF4-FFF2-40B4-BE49-F238E27FC236}">
+                <a16:creationId xmlns:a16="http://schemas.microsoft.com/office/drawing/2014/main" id="{B55385F1-C3B2-493D-A2AF-C6CB8C5D0FFD}"/>
+              </a:ext>
+            </a:extLst>
+          </p:cNvPr>
+          <p:cNvPicPr>
+            <a:picLocks noChangeAspect="1"/>
+          </p:cNvPicPr>
+          <p:nvPr/>
+        </p:nvPicPr>
+        <p:blipFill>
+          <a:blip r:embed="rId4"/>
+          <a:stretch>
+            <a:fillRect/>
+          </a:stretch>
+        </p:blipFill>
+        <p:spPr>
+          <a:xfrm>
+            <a:off x="9259765" y="1195376"/>
+            <a:ext cx="2305050" cy="1647825"/>
+          </a:xfrm>
+          <a:prstGeom prst="rect">
+            <a:avLst/>
+          </a:prstGeom>
+        </p:spPr>
+      </p:pic>
+      <p:pic>
+        <p:nvPicPr>
+          <p:cNvPr id="7" name="Picture 6">
+            <a:extLst>
+              <a:ext uri="{FF2B5EF4-FFF2-40B4-BE49-F238E27FC236}">
+                <a16:creationId xmlns:a16="http://schemas.microsoft.com/office/drawing/2014/main" id="{C5ACC244-7669-4E5D-9C51-5B7E8945A091}"/>
+              </a:ext>
+            </a:extLst>
+          </p:cNvPr>
+          <p:cNvPicPr>
+            <a:picLocks noChangeAspect="1"/>
+          </p:cNvPicPr>
+          <p:nvPr/>
+        </p:nvPicPr>
+        <p:blipFill>
+          <a:blip r:embed="rId5"/>
+          <a:stretch>
+            <a:fillRect/>
+          </a:stretch>
+        </p:blipFill>
+        <p:spPr>
+          <a:xfrm>
+            <a:off x="5585239" y="1825625"/>
+            <a:ext cx="3171825" cy="1685925"/>
+          </a:xfrm>
+          <a:prstGeom prst="rect">
+            <a:avLst/>
+          </a:prstGeom>
+        </p:spPr>
+      </p:pic>
+      <p:pic>
+        <p:nvPicPr>
+          <p:cNvPr id="8" name="Picture 7">
+            <a:extLst>
+              <a:ext uri="{FF2B5EF4-FFF2-40B4-BE49-F238E27FC236}">
+                <a16:creationId xmlns:a16="http://schemas.microsoft.com/office/drawing/2014/main" id="{192E0C1A-DDD7-4C9E-A1B1-A9689BBEDEFD}"/>
+              </a:ext>
+            </a:extLst>
+          </p:cNvPr>
+          <p:cNvPicPr>
+            <a:picLocks noChangeAspect="1"/>
+          </p:cNvPicPr>
+          <p:nvPr/>
+        </p:nvPicPr>
+        <p:blipFill>
+          <a:blip r:embed="rId6"/>
+          <a:stretch>
+            <a:fillRect/>
+          </a:stretch>
+        </p:blipFill>
+        <p:spPr>
+          <a:xfrm>
+            <a:off x="709612" y="5678292"/>
+            <a:ext cx="4305300" cy="209550"/>
+          </a:xfrm>
+          <a:prstGeom prst="rect">
+            <a:avLst/>
+          </a:prstGeom>
+        </p:spPr>
+      </p:pic>
+    </p:spTree>
+    <p:extLst>
+      <p:ext uri="{BB962C8B-B14F-4D97-AF65-F5344CB8AC3E}">
+        <p14:creationId xmlns:p14="http://schemas.microsoft.com/office/powerpoint/2010/main" val="1029799801"/>
+      </p:ext>
+    </p:extLst>
+  </p:cSld>
+  <p:clrMapOvr>
+    <a:masterClrMapping/>
+  </p:clrMapOvr>
+</p:sld>
+</file>
+
+<file path=ppt/slides/slide17.xml><?xml version="1.0" encoding="utf-8"?>
 <p:sld xmlns:a="http://schemas.openxmlformats.org/drawingml/2006/main" xmlns:r="http://schemas.openxmlformats.org/officeDocument/2006/relationships" xmlns:p="http://schemas.openxmlformats.org/presentationml/2006/main">
   <p:cSld>
     <p:spTree>

</xml_diff>